<commit_message>
Added foreword to non-Python3 packages presentations
</commit_message>
<xml_diff>
--- a/python/presentations/data_tools/02_cfpython_cfplot.pptx
+++ b/python/presentations/data_tools/02_cfpython_cfplot.pptx
@@ -5,22 +5,23 @@
     <p:sldMasterId id="2147483660" r:id="rId1"/>
   </p:sldMasterIdLst>
   <p:notesMasterIdLst>
-    <p:notesMasterId r:id="rId15"/>
+    <p:notesMasterId r:id="rId16"/>
   </p:notesMasterIdLst>
   <p:sldIdLst>
     <p:sldId id="337" r:id="rId2"/>
     <p:sldId id="300" r:id="rId3"/>
-    <p:sldId id="308" r:id="rId4"/>
-    <p:sldId id="312" r:id="rId5"/>
-    <p:sldId id="332" r:id="rId6"/>
-    <p:sldId id="322" r:id="rId7"/>
-    <p:sldId id="333" r:id="rId8"/>
-    <p:sldId id="335" r:id="rId9"/>
-    <p:sldId id="336" r:id="rId10"/>
-    <p:sldId id="323" r:id="rId11"/>
-    <p:sldId id="334" r:id="rId12"/>
-    <p:sldId id="327" r:id="rId13"/>
-    <p:sldId id="299" r:id="rId14"/>
+    <p:sldId id="338" r:id="rId4"/>
+    <p:sldId id="308" r:id="rId5"/>
+    <p:sldId id="312" r:id="rId6"/>
+    <p:sldId id="332" r:id="rId7"/>
+    <p:sldId id="322" r:id="rId8"/>
+    <p:sldId id="333" r:id="rId9"/>
+    <p:sldId id="335" r:id="rId10"/>
+    <p:sldId id="336" r:id="rId11"/>
+    <p:sldId id="323" r:id="rId12"/>
+    <p:sldId id="334" r:id="rId13"/>
+    <p:sldId id="327" r:id="rId14"/>
+    <p:sldId id="299" r:id="rId15"/>
   </p:sldIdLst>
   <p:sldSz cx="9144000" cy="6858000" type="screen4x3"/>
   <p:notesSz cx="6858000" cy="9144000"/>
@@ -268,7 +269,7 @@
               <a:pPr>
                 <a:defRPr/>
               </a:pPr>
-              <a:t>09/10/2018</a:t>
+              <a:t>16/10/2018</a:t>
             </a:fld>
             <a:endParaRPr lang="en-GB" dirty="0"/>
           </a:p>
@@ -1512,7 +1513,7 @@
               <a:pPr>
                 <a:defRPr/>
               </a:pPr>
-              <a:t>09/10/2018</a:t>
+              <a:t>16/10/2018</a:t>
             </a:fld>
             <a:endParaRPr lang="en-GB" dirty="0"/>
           </a:p>
@@ -2654,6 +2655,714 @@
       </p:grpSpPr>
       <p:sp>
         <p:nvSpPr>
+          <p:cNvPr id="16386" name="Title 1"/>
+          <p:cNvSpPr txBox="1">
+            <a:spLocks/>
+          </p:cNvSpPr>
+          <p:nvPr/>
+        </p:nvSpPr>
+        <p:spPr bwMode="auto">
+          <a:xfrm>
+            <a:off x="457200" y="274638"/>
+            <a:ext cx="8229600" cy="1143000"/>
+          </a:xfrm>
+          <a:prstGeom prst="rect">
+            <a:avLst/>
+          </a:prstGeom>
+          <a:noFill/>
+          <a:ln>
+            <a:noFill/>
+          </a:ln>
+          <a:extLst>
+            <a:ext uri="{909E8E84-426E-40DD-AFC4-6F175D3DCCD1}">
+              <a14:hiddenFill xmlns:a14="http://schemas.microsoft.com/office/drawing/2010/main">
+                <a:solidFill>
+                  <a:srgbClr val="FFFFFF"/>
+                </a:solidFill>
+              </a14:hiddenFill>
+            </a:ext>
+            <a:ext uri="{91240B29-F687-4F45-9708-019B960494DF}">
+              <a14:hiddenLine xmlns:a14="http://schemas.microsoft.com/office/drawing/2010/main" w="9525">
+                <a:solidFill>
+                  <a:srgbClr val="000000"/>
+                </a:solidFill>
+                <a:miter lim="800000"/>
+                <a:headEnd/>
+                <a:tailEnd/>
+              </a14:hiddenLine>
+            </a:ext>
+          </a:extLst>
+        </p:spPr>
+        <p:txBody>
+          <a:bodyPr anchor="ctr"/>
+          <a:lstStyle>
+            <a:lvl1pPr>
+              <a:lnSpc>
+                <a:spcPct val="90000"/>
+              </a:lnSpc>
+              <a:spcBef>
+                <a:spcPts val="1000"/>
+              </a:spcBef>
+              <a:buFont typeface="Arial" panose="020B0604020202020204" pitchFamily="34" charset="0"/>
+              <a:buChar char="•"/>
+              <a:defRPr sz="2400">
+                <a:solidFill>
+                  <a:schemeClr val="tx1"/>
+                </a:solidFill>
+                <a:latin typeface="Calibri" panose="020F0502020204030204" pitchFamily="34" charset="0"/>
+              </a:defRPr>
+            </a:lvl1pPr>
+            <a:lvl2pPr marL="742950" indent="-285750">
+              <a:lnSpc>
+                <a:spcPct val="90000"/>
+              </a:lnSpc>
+              <a:spcBef>
+                <a:spcPts val="500"/>
+              </a:spcBef>
+              <a:buFont typeface="Arial" panose="020B0604020202020204" pitchFamily="34" charset="0"/>
+              <a:buChar char="•"/>
+              <a:defRPr sz="2000">
+                <a:solidFill>
+                  <a:schemeClr val="tx1"/>
+                </a:solidFill>
+                <a:latin typeface="Calibri" panose="020F0502020204030204" pitchFamily="34" charset="0"/>
+              </a:defRPr>
+            </a:lvl2pPr>
+            <a:lvl3pPr marL="1143000" indent="-228600">
+              <a:lnSpc>
+                <a:spcPct val="90000"/>
+              </a:lnSpc>
+              <a:spcBef>
+                <a:spcPts val="500"/>
+              </a:spcBef>
+              <a:buFont typeface="Arial" panose="020B0604020202020204" pitchFamily="34" charset="0"/>
+              <a:buChar char="•"/>
+              <a:defRPr>
+                <a:solidFill>
+                  <a:schemeClr val="tx1"/>
+                </a:solidFill>
+                <a:latin typeface="Calibri" panose="020F0502020204030204" pitchFamily="34" charset="0"/>
+              </a:defRPr>
+            </a:lvl3pPr>
+            <a:lvl4pPr marL="1600200" indent="-228600">
+              <a:lnSpc>
+                <a:spcPct val="90000"/>
+              </a:lnSpc>
+              <a:spcBef>
+                <a:spcPts val="500"/>
+              </a:spcBef>
+              <a:buFont typeface="Arial" panose="020B0604020202020204" pitchFamily="34" charset="0"/>
+              <a:buChar char="•"/>
+              <a:defRPr sz="1600">
+                <a:solidFill>
+                  <a:schemeClr val="tx1"/>
+                </a:solidFill>
+                <a:latin typeface="Calibri" panose="020F0502020204030204" pitchFamily="34" charset="0"/>
+              </a:defRPr>
+            </a:lvl4pPr>
+            <a:lvl5pPr marL="2057400" indent="-228600">
+              <a:lnSpc>
+                <a:spcPct val="90000"/>
+              </a:lnSpc>
+              <a:spcBef>
+                <a:spcPts val="500"/>
+              </a:spcBef>
+              <a:buFont typeface="Arial" panose="020B0604020202020204" pitchFamily="34" charset="0"/>
+              <a:buChar char="•"/>
+              <a:defRPr sz="1600">
+                <a:solidFill>
+                  <a:schemeClr val="tx1"/>
+                </a:solidFill>
+                <a:latin typeface="Calibri" panose="020F0502020204030204" pitchFamily="34" charset="0"/>
+              </a:defRPr>
+            </a:lvl5pPr>
+            <a:lvl6pPr marL="2514600" indent="-228600" fontAlgn="base">
+              <a:lnSpc>
+                <a:spcPct val="90000"/>
+              </a:lnSpc>
+              <a:spcBef>
+                <a:spcPts val="500"/>
+              </a:spcBef>
+              <a:spcAft>
+                <a:spcPct val="0"/>
+              </a:spcAft>
+              <a:buFont typeface="Arial" panose="020B0604020202020204" pitchFamily="34" charset="0"/>
+              <a:buChar char="•"/>
+              <a:defRPr sz="1600">
+                <a:solidFill>
+                  <a:schemeClr val="tx1"/>
+                </a:solidFill>
+                <a:latin typeface="Calibri" panose="020F0502020204030204" pitchFamily="34" charset="0"/>
+              </a:defRPr>
+            </a:lvl6pPr>
+            <a:lvl7pPr marL="2971800" indent="-228600" fontAlgn="base">
+              <a:lnSpc>
+                <a:spcPct val="90000"/>
+              </a:lnSpc>
+              <a:spcBef>
+                <a:spcPts val="500"/>
+              </a:spcBef>
+              <a:spcAft>
+                <a:spcPct val="0"/>
+              </a:spcAft>
+              <a:buFont typeface="Arial" panose="020B0604020202020204" pitchFamily="34" charset="0"/>
+              <a:buChar char="•"/>
+              <a:defRPr sz="1600">
+                <a:solidFill>
+                  <a:schemeClr val="tx1"/>
+                </a:solidFill>
+                <a:latin typeface="Calibri" panose="020F0502020204030204" pitchFamily="34" charset="0"/>
+              </a:defRPr>
+            </a:lvl7pPr>
+            <a:lvl8pPr marL="3429000" indent="-228600" fontAlgn="base">
+              <a:lnSpc>
+                <a:spcPct val="90000"/>
+              </a:lnSpc>
+              <a:spcBef>
+                <a:spcPts val="500"/>
+              </a:spcBef>
+              <a:spcAft>
+                <a:spcPct val="0"/>
+              </a:spcAft>
+              <a:buFont typeface="Arial" panose="020B0604020202020204" pitchFamily="34" charset="0"/>
+              <a:buChar char="•"/>
+              <a:defRPr sz="1600">
+                <a:solidFill>
+                  <a:schemeClr val="tx1"/>
+                </a:solidFill>
+                <a:latin typeface="Calibri" panose="020F0502020204030204" pitchFamily="34" charset="0"/>
+              </a:defRPr>
+            </a:lvl8pPr>
+            <a:lvl9pPr marL="3886200" indent="-228600" fontAlgn="base">
+              <a:lnSpc>
+                <a:spcPct val="90000"/>
+              </a:lnSpc>
+              <a:spcBef>
+                <a:spcPts val="500"/>
+              </a:spcBef>
+              <a:spcAft>
+                <a:spcPct val="0"/>
+              </a:spcAft>
+              <a:buFont typeface="Arial" panose="020B0604020202020204" pitchFamily="34" charset="0"/>
+              <a:buChar char="•"/>
+              <a:defRPr sz="1600">
+                <a:solidFill>
+                  <a:schemeClr val="tx1"/>
+                </a:solidFill>
+                <a:latin typeface="Calibri" panose="020F0502020204030204" pitchFamily="34" charset="0"/>
+              </a:defRPr>
+            </a:lvl9pPr>
+          </a:lstStyle>
+          <a:p>
+            <a:pPr algn="ctr">
+              <a:lnSpc>
+                <a:spcPct val="100000"/>
+              </a:lnSpc>
+              <a:spcBef>
+                <a:spcPct val="0"/>
+              </a:spcBef>
+              <a:buFontTx/>
+              <a:buNone/>
+            </a:pPr>
+            <a:r>
+              <a:rPr lang="en-GB" altLang="en-US" sz="4400" b="1">
+                <a:cs typeface="Calibri" panose="020F0502020204030204" pitchFamily="34" charset="0"/>
+              </a:rPr>
+              <a:t>cfa example</a:t>
+            </a:r>
+          </a:p>
+        </p:txBody>
+      </p:sp>
+      <p:sp>
+        <p:nvSpPr>
+          <p:cNvPr id="16387" name="TextBox 2"/>
+          <p:cNvSpPr txBox="1">
+            <a:spLocks noChangeArrowheads="1"/>
+          </p:cNvSpPr>
+          <p:nvPr/>
+        </p:nvSpPr>
+        <p:spPr bwMode="auto">
+          <a:xfrm>
+            <a:off x="468313" y="1268413"/>
+            <a:ext cx="8424862" cy="4894262"/>
+          </a:xfrm>
+          <a:prstGeom prst="rect">
+            <a:avLst/>
+          </a:prstGeom>
+          <a:noFill/>
+          <a:ln>
+            <a:noFill/>
+          </a:ln>
+          <a:extLst>
+            <a:ext uri="{909E8E84-426E-40DD-AFC4-6F175D3DCCD1}">
+              <a14:hiddenFill xmlns:a14="http://schemas.microsoft.com/office/drawing/2010/main">
+                <a:solidFill>
+                  <a:srgbClr val="FFFFFF"/>
+                </a:solidFill>
+              </a14:hiddenFill>
+            </a:ext>
+            <a:ext uri="{91240B29-F687-4F45-9708-019B960494DF}">
+              <a14:hiddenLine xmlns:a14="http://schemas.microsoft.com/office/drawing/2010/main" w="9525">
+                <a:solidFill>
+                  <a:srgbClr val="000000"/>
+                </a:solidFill>
+                <a:miter lim="800000"/>
+                <a:headEnd/>
+                <a:tailEnd/>
+              </a14:hiddenLine>
+            </a:ext>
+          </a:extLst>
+        </p:spPr>
+        <p:txBody>
+          <a:bodyPr>
+            <a:spAutoFit/>
+          </a:bodyPr>
+          <a:lstStyle>
+            <a:lvl1pPr>
+              <a:lnSpc>
+                <a:spcPct val="90000"/>
+              </a:lnSpc>
+              <a:spcBef>
+                <a:spcPts val="1000"/>
+              </a:spcBef>
+              <a:buFont typeface="Arial" panose="020B0604020202020204" pitchFamily="34" charset="0"/>
+              <a:buChar char="•"/>
+              <a:defRPr sz="2400">
+                <a:solidFill>
+                  <a:schemeClr val="tx1"/>
+                </a:solidFill>
+                <a:latin typeface="Calibri" panose="020F0502020204030204" pitchFamily="34" charset="0"/>
+              </a:defRPr>
+            </a:lvl1pPr>
+            <a:lvl2pPr marL="742950" indent="-285750">
+              <a:lnSpc>
+                <a:spcPct val="90000"/>
+              </a:lnSpc>
+              <a:spcBef>
+                <a:spcPts val="500"/>
+              </a:spcBef>
+              <a:buFont typeface="Arial" panose="020B0604020202020204" pitchFamily="34" charset="0"/>
+              <a:buChar char="•"/>
+              <a:defRPr sz="2000">
+                <a:solidFill>
+                  <a:schemeClr val="tx1"/>
+                </a:solidFill>
+                <a:latin typeface="Calibri" panose="020F0502020204030204" pitchFamily="34" charset="0"/>
+              </a:defRPr>
+            </a:lvl2pPr>
+            <a:lvl3pPr marL="1143000" indent="-228600">
+              <a:lnSpc>
+                <a:spcPct val="90000"/>
+              </a:lnSpc>
+              <a:spcBef>
+                <a:spcPts val="500"/>
+              </a:spcBef>
+              <a:buFont typeface="Arial" panose="020B0604020202020204" pitchFamily="34" charset="0"/>
+              <a:buChar char="•"/>
+              <a:defRPr>
+                <a:solidFill>
+                  <a:schemeClr val="tx1"/>
+                </a:solidFill>
+                <a:latin typeface="Calibri" panose="020F0502020204030204" pitchFamily="34" charset="0"/>
+              </a:defRPr>
+            </a:lvl3pPr>
+            <a:lvl4pPr marL="1600200" indent="-228600">
+              <a:lnSpc>
+                <a:spcPct val="90000"/>
+              </a:lnSpc>
+              <a:spcBef>
+                <a:spcPts val="500"/>
+              </a:spcBef>
+              <a:buFont typeface="Arial" panose="020B0604020202020204" pitchFamily="34" charset="0"/>
+              <a:buChar char="•"/>
+              <a:defRPr sz="1600">
+                <a:solidFill>
+                  <a:schemeClr val="tx1"/>
+                </a:solidFill>
+                <a:latin typeface="Calibri" panose="020F0502020204030204" pitchFamily="34" charset="0"/>
+              </a:defRPr>
+            </a:lvl4pPr>
+            <a:lvl5pPr marL="2057400" indent="-228600">
+              <a:lnSpc>
+                <a:spcPct val="90000"/>
+              </a:lnSpc>
+              <a:spcBef>
+                <a:spcPts val="500"/>
+              </a:spcBef>
+              <a:buFont typeface="Arial" panose="020B0604020202020204" pitchFamily="34" charset="0"/>
+              <a:buChar char="•"/>
+              <a:defRPr sz="1600">
+                <a:solidFill>
+                  <a:schemeClr val="tx1"/>
+                </a:solidFill>
+                <a:latin typeface="Calibri" panose="020F0502020204030204" pitchFamily="34" charset="0"/>
+              </a:defRPr>
+            </a:lvl5pPr>
+            <a:lvl6pPr marL="2514600" indent="-228600" fontAlgn="base">
+              <a:lnSpc>
+                <a:spcPct val="90000"/>
+              </a:lnSpc>
+              <a:spcBef>
+                <a:spcPts val="500"/>
+              </a:spcBef>
+              <a:spcAft>
+                <a:spcPct val="0"/>
+              </a:spcAft>
+              <a:buFont typeface="Arial" panose="020B0604020202020204" pitchFamily="34" charset="0"/>
+              <a:buChar char="•"/>
+              <a:defRPr sz="1600">
+                <a:solidFill>
+                  <a:schemeClr val="tx1"/>
+                </a:solidFill>
+                <a:latin typeface="Calibri" panose="020F0502020204030204" pitchFamily="34" charset="0"/>
+              </a:defRPr>
+            </a:lvl6pPr>
+            <a:lvl7pPr marL="2971800" indent="-228600" fontAlgn="base">
+              <a:lnSpc>
+                <a:spcPct val="90000"/>
+              </a:lnSpc>
+              <a:spcBef>
+                <a:spcPts val="500"/>
+              </a:spcBef>
+              <a:spcAft>
+                <a:spcPct val="0"/>
+              </a:spcAft>
+              <a:buFont typeface="Arial" panose="020B0604020202020204" pitchFamily="34" charset="0"/>
+              <a:buChar char="•"/>
+              <a:defRPr sz="1600">
+                <a:solidFill>
+                  <a:schemeClr val="tx1"/>
+                </a:solidFill>
+                <a:latin typeface="Calibri" panose="020F0502020204030204" pitchFamily="34" charset="0"/>
+              </a:defRPr>
+            </a:lvl7pPr>
+            <a:lvl8pPr marL="3429000" indent="-228600" fontAlgn="base">
+              <a:lnSpc>
+                <a:spcPct val="90000"/>
+              </a:lnSpc>
+              <a:spcBef>
+                <a:spcPts val="500"/>
+              </a:spcBef>
+              <a:spcAft>
+                <a:spcPct val="0"/>
+              </a:spcAft>
+              <a:buFont typeface="Arial" panose="020B0604020202020204" pitchFamily="34" charset="0"/>
+              <a:buChar char="•"/>
+              <a:defRPr sz="1600">
+                <a:solidFill>
+                  <a:schemeClr val="tx1"/>
+                </a:solidFill>
+                <a:latin typeface="Calibri" panose="020F0502020204030204" pitchFamily="34" charset="0"/>
+              </a:defRPr>
+            </a:lvl8pPr>
+            <a:lvl9pPr marL="3886200" indent="-228600" fontAlgn="base">
+              <a:lnSpc>
+                <a:spcPct val="90000"/>
+              </a:lnSpc>
+              <a:spcBef>
+                <a:spcPts val="500"/>
+              </a:spcBef>
+              <a:spcAft>
+                <a:spcPct val="0"/>
+              </a:spcAft>
+              <a:buFont typeface="Arial" panose="020B0604020202020204" pitchFamily="34" charset="0"/>
+              <a:buChar char="•"/>
+              <a:defRPr sz="1600">
+                <a:solidFill>
+                  <a:schemeClr val="tx1"/>
+                </a:solidFill>
+                <a:latin typeface="Calibri" panose="020F0502020204030204" pitchFamily="34" charset="0"/>
+              </a:defRPr>
+            </a:lvl9pPr>
+          </a:lstStyle>
+          <a:p>
+            <a:pPr eaLnBrk="1" hangingPunct="1">
+              <a:lnSpc>
+                <a:spcPct val="100000"/>
+              </a:lnSpc>
+              <a:spcBef>
+                <a:spcPct val="0"/>
+              </a:spcBef>
+              <a:buFontTx/>
+              <a:buNone/>
+            </a:pPr>
+            <a:r>
+              <a:rPr lang="en-GB" altLang="en-US" b="1">
+                <a:cs typeface="Calibri" panose="020F0502020204030204" pitchFamily="34" charset="0"/>
+              </a:rPr>
+              <a:t>cfa </a:t>
+            </a:r>
+            <a:r>
+              <a:rPr lang="en-GB" altLang="en-US">
+                <a:cs typeface="Calibri" panose="020F0502020204030204" pitchFamily="34" charset="0"/>
+              </a:rPr>
+              <a:t>can read multiple files and aggregate the contents into a single output file, e.g.:</a:t>
+            </a:r>
+          </a:p>
+          <a:p>
+            <a:pPr eaLnBrk="1" hangingPunct="1">
+              <a:lnSpc>
+                <a:spcPct val="100000"/>
+              </a:lnSpc>
+              <a:spcBef>
+                <a:spcPct val="0"/>
+              </a:spcBef>
+              <a:buFontTx/>
+              <a:buNone/>
+            </a:pPr>
+            <a:endParaRPr lang="en-GB" altLang="en-US">
+              <a:cs typeface="Calibri" panose="020F0502020204030204" pitchFamily="34" charset="0"/>
+            </a:endParaRPr>
+          </a:p>
+          <a:p>
+            <a:pPr>
+              <a:lnSpc>
+                <a:spcPct val="100000"/>
+              </a:lnSpc>
+              <a:spcBef>
+                <a:spcPct val="0"/>
+              </a:spcBef>
+              <a:buFontTx/>
+              <a:buNone/>
+            </a:pPr>
+            <a:r>
+              <a:rPr lang="en-GB" altLang="en-US" b="1">
+                <a:latin typeface="Courier New" panose="02070309020205020404" pitchFamily="49" charset="0"/>
+                <a:cs typeface="Courier New" panose="02070309020205020404" pitchFamily="49" charset="0"/>
+              </a:rPr>
+              <a:t>$ </a:t>
+            </a:r>
+            <a:r>
+              <a:rPr lang="en-GB" altLang="en-US">
+                <a:solidFill>
+                  <a:srgbClr val="336600"/>
+                </a:solidFill>
+                <a:latin typeface="Courier New" panose="02070309020205020404" pitchFamily="49" charset="0"/>
+                <a:cs typeface="Courier New" panose="02070309020205020404" pitchFamily="49" charset="0"/>
+              </a:rPr>
+              <a:t>cfa -o out.nc file1.nc file2.nc</a:t>
+            </a:r>
+          </a:p>
+          <a:p>
+            <a:pPr>
+              <a:lnSpc>
+                <a:spcPct val="100000"/>
+              </a:lnSpc>
+              <a:spcBef>
+                <a:spcPct val="0"/>
+              </a:spcBef>
+              <a:buFontTx/>
+              <a:buNone/>
+            </a:pPr>
+            <a:endParaRPr lang="en-GB" altLang="en-US">
+              <a:latin typeface="Courier New" panose="02070309020205020404" pitchFamily="49" charset="0"/>
+              <a:cs typeface="Courier New" panose="02070309020205020404" pitchFamily="49" charset="0"/>
+            </a:endParaRPr>
+          </a:p>
+          <a:p>
+            <a:pPr>
+              <a:lnSpc>
+                <a:spcPct val="100000"/>
+              </a:lnSpc>
+              <a:spcBef>
+                <a:spcPct val="0"/>
+              </a:spcBef>
+              <a:buFontTx/>
+              <a:buNone/>
+            </a:pPr>
+            <a:r>
+              <a:rPr lang="en-GB" altLang="en-US" b="1">
+                <a:latin typeface="Courier New" panose="02070309020205020404" pitchFamily="49" charset="0"/>
+                <a:cs typeface="Courier New" panose="02070309020205020404" pitchFamily="49" charset="0"/>
+              </a:rPr>
+              <a:t>$ </a:t>
+            </a:r>
+            <a:r>
+              <a:rPr lang="en-GB" altLang="en-US">
+                <a:solidFill>
+                  <a:srgbClr val="336600"/>
+                </a:solidFill>
+                <a:latin typeface="Courier New" panose="02070309020205020404" pitchFamily="49" charset="0"/>
+                <a:cs typeface="Courier New" panose="02070309020205020404" pitchFamily="49" charset="0"/>
+              </a:rPr>
+              <a:t>cfa -o out.nc file[1-9].nc</a:t>
+            </a:r>
+          </a:p>
+          <a:p>
+            <a:pPr>
+              <a:lnSpc>
+                <a:spcPct val="100000"/>
+              </a:lnSpc>
+              <a:spcBef>
+                <a:spcPct val="0"/>
+              </a:spcBef>
+              <a:buFontTx/>
+              <a:buNone/>
+            </a:pPr>
+            <a:endParaRPr lang="en-GB" altLang="en-US">
+              <a:latin typeface="Courier New" panose="02070309020205020404" pitchFamily="49" charset="0"/>
+              <a:cs typeface="Courier New" panose="02070309020205020404" pitchFamily="49" charset="0"/>
+            </a:endParaRPr>
+          </a:p>
+          <a:p>
+            <a:pPr>
+              <a:lnSpc>
+                <a:spcPct val="100000"/>
+              </a:lnSpc>
+              <a:spcBef>
+                <a:spcPct val="0"/>
+              </a:spcBef>
+              <a:buFontTx/>
+              <a:buNone/>
+            </a:pPr>
+            <a:r>
+              <a:rPr lang="en-GB" altLang="en-US" b="1">
+                <a:latin typeface="Courier New" panose="02070309020205020404" pitchFamily="49" charset="0"/>
+                <a:cs typeface="Courier New" panose="02070309020205020404" pitchFamily="49" charset="0"/>
+              </a:rPr>
+              <a:t>$ </a:t>
+            </a:r>
+            <a:r>
+              <a:rPr lang="en-GB" altLang="en-US">
+                <a:solidFill>
+                  <a:srgbClr val="336600"/>
+                </a:solidFill>
+                <a:latin typeface="Courier New" panose="02070309020205020404" pitchFamily="49" charset="0"/>
+                <a:cs typeface="Courier New" panose="02070309020205020404" pitchFamily="49" charset="0"/>
+              </a:rPr>
+              <a:t>cfa -f NETCDF3_CLASSIC -o out.nc data1/*.nc </a:t>
+            </a:r>
+            <a:br>
+              <a:rPr lang="en-GB" altLang="en-US">
+                <a:solidFill>
+                  <a:srgbClr val="336600"/>
+                </a:solidFill>
+                <a:latin typeface="Courier New" panose="02070309020205020404" pitchFamily="49" charset="0"/>
+                <a:cs typeface="Courier New" panose="02070309020205020404" pitchFamily="49" charset="0"/>
+              </a:rPr>
+            </a:br>
+            <a:r>
+              <a:rPr lang="en-GB" altLang="en-US">
+                <a:solidFill>
+                  <a:srgbClr val="336600"/>
+                </a:solidFill>
+                <a:latin typeface="Courier New" panose="02070309020205020404" pitchFamily="49" charset="0"/>
+                <a:cs typeface="Courier New" panose="02070309020205020404" pitchFamily="49" charset="0"/>
+              </a:rPr>
+              <a:t>    data2/*.nc</a:t>
+            </a:r>
+          </a:p>
+          <a:p>
+            <a:pPr>
+              <a:lnSpc>
+                <a:spcPct val="100000"/>
+              </a:lnSpc>
+              <a:spcBef>
+                <a:spcPct val="0"/>
+              </a:spcBef>
+              <a:buFontTx/>
+              <a:buNone/>
+            </a:pPr>
+            <a:endParaRPr lang="en-GB" altLang="en-US">
+              <a:latin typeface="Courier New" panose="02070309020205020404" pitchFamily="49" charset="0"/>
+              <a:cs typeface="Courier New" panose="02070309020205020404" pitchFamily="49" charset="0"/>
+            </a:endParaRPr>
+          </a:p>
+          <a:p>
+            <a:pPr>
+              <a:lnSpc>
+                <a:spcPct val="100000"/>
+              </a:lnSpc>
+              <a:spcBef>
+                <a:spcPct val="0"/>
+              </a:spcBef>
+              <a:buFontTx/>
+              <a:buNone/>
+            </a:pPr>
+            <a:r>
+              <a:rPr lang="en-GB" altLang="en-US" b="1">
+                <a:latin typeface="Courier New" panose="02070309020205020404" pitchFamily="49" charset="0"/>
+                <a:cs typeface="Courier New" panose="02070309020205020404" pitchFamily="49" charset="0"/>
+              </a:rPr>
+              <a:t>$ </a:t>
+            </a:r>
+            <a:r>
+              <a:rPr lang="pt-BR" altLang="en-US">
+                <a:solidFill>
+                  <a:srgbClr val="336600"/>
+                </a:solidFill>
+                <a:latin typeface="Courier New" panose="02070309020205020404" pitchFamily="49" charset="0"/>
+                <a:cs typeface="Courier New" panose="02070309020205020404" pitchFamily="49" charset="0"/>
+              </a:rPr>
+              <a:t>cfa -o out.nc </a:t>
+            </a:r>
+            <a:br>
+              <a:rPr lang="pt-BR" altLang="en-US">
+                <a:solidFill>
+                  <a:srgbClr val="336600"/>
+                </a:solidFill>
+                <a:latin typeface="Courier New" panose="02070309020205020404" pitchFamily="49" charset="0"/>
+                <a:cs typeface="Courier New" panose="02070309020205020404" pitchFamily="49" charset="0"/>
+              </a:rPr>
+            </a:br>
+            <a:r>
+              <a:rPr lang="pt-BR" altLang="en-US">
+                <a:solidFill>
+                  <a:srgbClr val="336600"/>
+                </a:solidFill>
+                <a:latin typeface="Courier New" panose="02070309020205020404" pitchFamily="49" charset="0"/>
+                <a:cs typeface="Courier New" panose="02070309020205020404" pitchFamily="49" charset="0"/>
+              </a:rPr>
+              <a:t>	http://test.opendap.org/dap/coads_climat	ology.nc file*.nc   </a:t>
+            </a:r>
+            <a:r>
+              <a:rPr lang="pt-BR" altLang="en-US">
+                <a:latin typeface="Courier New" panose="02070309020205020404" pitchFamily="49" charset="0"/>
+                <a:cs typeface="Courier New" panose="02070309020205020404" pitchFamily="49" charset="0"/>
+              </a:rPr>
+              <a:t># remote file(s)</a:t>
+            </a:r>
+            <a:endParaRPr lang="en-GB" altLang="en-US">
+              <a:latin typeface="Courier New" panose="02070309020205020404" pitchFamily="49" charset="0"/>
+              <a:cs typeface="Courier New" panose="02070309020205020404" pitchFamily="49" charset="0"/>
+            </a:endParaRPr>
+          </a:p>
+        </p:txBody>
+      </p:sp>
+    </p:spTree>
+  </p:cSld>
+  <p:clrMapOvr>
+    <a:masterClrMapping/>
+  </p:clrMapOvr>
+  <p:timing>
+    <p:tnLst>
+      <p:par>
+        <p:cTn id="1" dur="indefinite" restart="never" nodeType="tmRoot"/>
+      </p:par>
+    </p:tnLst>
+  </p:timing>
+</p:sld>
+</file>
+
+<file path=ppt/slides/slide11.xml><?xml version="1.0" encoding="utf-8"?>
+<p:sld xmlns:a="http://schemas.openxmlformats.org/drawingml/2006/main" xmlns:r="http://schemas.openxmlformats.org/officeDocument/2006/relationships" xmlns:p="http://schemas.openxmlformats.org/presentationml/2006/main">
+  <p:cSld>
+    <p:spTree>
+      <p:nvGrpSpPr>
+        <p:cNvPr id="1" name=""/>
+        <p:cNvGrpSpPr/>
+        <p:nvPr/>
+      </p:nvGrpSpPr>
+      <p:grpSpPr>
+        <a:xfrm>
+          <a:off x="0" y="0"/>
+          <a:ext cx="0" cy="0"/>
+          <a:chOff x="0" y="0"/>
+          <a:chExt cx="0" cy="0"/>
+        </a:xfrm>
+      </p:grpSpPr>
+      <p:sp>
+        <p:nvSpPr>
           <p:cNvPr id="17410" name="Title 1"/>
           <p:cNvSpPr txBox="1">
             <a:spLocks/>
@@ -3281,7 +3990,7 @@
 </p:sld>
 </file>
 
-<file path=ppt/slides/slide11.xml><?xml version="1.0" encoding="utf-8"?>
+<file path=ppt/slides/slide12.xml><?xml version="1.0" encoding="utf-8"?>
 <p:sld xmlns:a="http://schemas.openxmlformats.org/drawingml/2006/main" xmlns:r="http://schemas.openxmlformats.org/officeDocument/2006/relationships" xmlns:p="http://schemas.openxmlformats.org/presentationml/2006/main">
   <p:cSld>
     <p:spTree>
@@ -3897,7 +4606,7 @@
 </p:sld>
 </file>
 
-<file path=ppt/slides/slide12.xml><?xml version="1.0" encoding="utf-8"?>
+<file path=ppt/slides/slide13.xml><?xml version="1.0" encoding="utf-8"?>
 <p:sld xmlns:a="http://schemas.openxmlformats.org/drawingml/2006/main" xmlns:r="http://schemas.openxmlformats.org/officeDocument/2006/relationships" xmlns:p="http://schemas.openxmlformats.org/presentationml/2006/main">
   <p:cSld>
     <p:spTree>
@@ -4430,7 +5139,7 @@
 </p:sld>
 </file>
 
-<file path=ppt/slides/slide13.xml><?xml version="1.0" encoding="utf-8"?>
+<file path=ppt/slides/slide14.xml><?xml version="1.0" encoding="utf-8"?>
 <p:sld xmlns:a="http://schemas.openxmlformats.org/drawingml/2006/main" xmlns:r="http://schemas.openxmlformats.org/officeDocument/2006/relationships" xmlns:p="http://schemas.openxmlformats.org/presentationml/2006/main">
   <p:cSld>
     <p:spTree>
@@ -4524,23 +5233,7 @@
                 <a:cs typeface="Calibri" panose="020F0502020204030204" pitchFamily="34" charset="0"/>
                 <a:hlinkClick r:id="rId2"/>
               </a:rPr>
-              <a:t>https</a:t>
-            </a:r>
-            <a:r>
-              <a:rPr lang="en-GB" sz="2800" spc="-5" dirty="0">
-                <a:latin typeface="Calibri" panose="020F0502020204030204" pitchFamily="34" charset="0"/>
-                <a:cs typeface="Calibri" panose="020F0502020204030204" pitchFamily="34" charset="0"/>
-                <a:hlinkClick r:id="rId2"/>
-              </a:rPr>
-              <a:t>://</a:t>
-            </a:r>
-            <a:r>
-              <a:rPr lang="en-GB" sz="2800" spc="-5" dirty="0">
-                <a:latin typeface="Calibri" panose="020F0502020204030204" pitchFamily="34" charset="0"/>
-                <a:cs typeface="Calibri" panose="020F0502020204030204" pitchFamily="34" charset="0"/>
-                <a:hlinkClick r:id="rId2"/>
-              </a:rPr>
-              <a:t>cfpython.bitbucket.io/docs/latest/index.html</a:t>
+              <a:t>https://cfpython.bitbucket.io/docs/latest/index.html</a:t>
             </a:r>
             <a:endParaRPr lang="en-GB" sz="2800" spc="-5" dirty="0">
               <a:latin typeface="Calibri" panose="020F0502020204030204" pitchFamily="34" charset="0"/>
@@ -4565,26 +5258,15 @@
                 <a:latin typeface="Calibri" panose="020F0502020204030204" pitchFamily="34" charset="0"/>
                 <a:cs typeface="Calibri" panose="020F0502020204030204" pitchFamily="34" charset="0"/>
               </a:rPr>
-              <a:t>c</a:t>
-            </a:r>
-            <a:r>
-              <a:rPr lang="en-GB" sz="2800" spc="-5" dirty="0" err="1">
+              <a:t>cf</a:t>
+            </a:r>
+            <a:r>
+              <a:rPr lang="en-GB" sz="2800" spc="-5" dirty="0">
                 <a:latin typeface="Calibri" panose="020F0502020204030204" pitchFamily="34" charset="0"/>
                 <a:cs typeface="Calibri" panose="020F0502020204030204" pitchFamily="34" charset="0"/>
               </a:rPr>
-              <a:t>f</a:t>
-            </a:r>
-            <a:r>
-              <a:rPr lang="en-GB" sz="2800" spc="-5" dirty="0">
-                <a:latin typeface="Calibri" panose="020F0502020204030204" pitchFamily="34" charset="0"/>
-                <a:cs typeface="Calibri" panose="020F0502020204030204" pitchFamily="34" charset="0"/>
-              </a:rPr>
               <a:t> tools:</a:t>
             </a:r>
-            <a:endParaRPr lang="en-GB" sz="2800" spc="-5" dirty="0">
-              <a:latin typeface="Calibri" panose="020F0502020204030204" pitchFamily="34" charset="0"/>
-              <a:cs typeface="Calibri" panose="020F0502020204030204" pitchFamily="34" charset="0"/>
-            </a:endParaRPr>
           </a:p>
           <a:p>
             <a:pPr eaLnBrk="1" hangingPunct="1">
@@ -4596,15 +5278,7 @@
                 <a:cs typeface="Calibri" panose="020F0502020204030204" pitchFamily="34" charset="0"/>
                 <a:hlinkClick r:id="rId3"/>
               </a:rPr>
-              <a:t>http://</a:t>
-            </a:r>
-            <a:r>
-              <a:rPr lang="en-GB" sz="2800" spc="-5" dirty="0">
-                <a:latin typeface="Calibri" panose="020F0502020204030204" pitchFamily="34" charset="0"/>
-                <a:cs typeface="Calibri" panose="020F0502020204030204" pitchFamily="34" charset="0"/>
-                <a:hlinkClick r:id="rId3"/>
-              </a:rPr>
-              <a:t>cms.ncas.ac.uk/wiki/ToolsAndUtilities</a:t>
+              <a:t>http://cms.ncas.ac.uk/wiki/ToolsAndUtilities</a:t>
             </a:r>
             <a:endParaRPr lang="en-GB" sz="2800" spc="-5" dirty="0">
               <a:latin typeface="Calibri" panose="020F0502020204030204" pitchFamily="34" charset="0"/>
@@ -4649,23 +5323,7 @@
                 <a:cs typeface="Calibri" panose="020F0502020204030204" pitchFamily="34" charset="0"/>
                 <a:hlinkClick r:id="rId4"/>
               </a:rPr>
-              <a:t>http</a:t>
-            </a:r>
-            <a:r>
-              <a:rPr lang="en-GB" sz="3200" spc="-5" dirty="0">
-                <a:latin typeface="Calibri" panose="020F0502020204030204" pitchFamily="34" charset="0"/>
-                <a:cs typeface="Calibri" panose="020F0502020204030204" pitchFamily="34" charset="0"/>
-                <a:hlinkClick r:id="rId4"/>
-              </a:rPr>
-              <a:t>://ajheaps.github.io/cf-plot</a:t>
-            </a:r>
-            <a:r>
-              <a:rPr lang="en-GB" sz="3200" spc="-5" dirty="0">
-                <a:latin typeface="Calibri" panose="020F0502020204030204" pitchFamily="34" charset="0"/>
-                <a:cs typeface="Calibri" panose="020F0502020204030204" pitchFamily="34" charset="0"/>
-                <a:hlinkClick r:id="rId4"/>
-              </a:rPr>
-              <a:t>/</a:t>
+              <a:t>http://ajheaps.github.io/cf-plot/</a:t>
             </a:r>
             <a:endParaRPr lang="en-GB" sz="2800" dirty="0">
               <a:latin typeface="Calibri" panose="020F0502020204030204" pitchFamily="34" charset="0"/>
@@ -4727,8 +5385,16 @@
           <a:lstStyle/>
           <a:p>
             <a:r>
-              <a:rPr lang="en-GB" altLang="en-US" b="1" smtClean="0"/>
-              <a:t>What is cf-python?</a:t>
+              <a:rPr lang="en-GB" altLang="en-US" b="1" dirty="0" smtClean="0"/>
+              <a:t>What is </a:t>
+            </a:r>
+            <a:r>
+              <a:rPr lang="en-GB" altLang="en-US" b="1" dirty="0" err="1" smtClean="0"/>
+              <a:t>cf</a:t>
+            </a:r>
+            <a:r>
+              <a:rPr lang="en-GB" altLang="en-US" b="1" dirty="0" smtClean="0"/>
+              <a:t>-python?</a:t>
             </a:r>
           </a:p>
         </p:txBody>
@@ -4770,19 +5436,8 @@
                 <a:latin typeface="Calibri" panose="020F0502020204030204" pitchFamily="34" charset="0"/>
                 <a:cs typeface="Calibri" panose="020F0502020204030204" pitchFamily="34" charset="0"/>
               </a:rPr>
-              <a:t>-python is an implementation of the CF data model that</a:t>
-            </a:r>
-            <a:r>
-              <a:rPr lang="en-GB" sz="2800" spc="-5" dirty="0">
-                <a:latin typeface="Calibri" panose="020F0502020204030204" pitchFamily="34" charset="0"/>
-                <a:cs typeface="Calibri" panose="020F0502020204030204" pitchFamily="34" charset="0"/>
-              </a:rPr>
-              <a:t>:</a:t>
-            </a:r>
-            <a:endParaRPr lang="en-GB" sz="2800" spc="-5" dirty="0">
-              <a:latin typeface="Calibri" panose="020F0502020204030204" pitchFamily="34" charset="0"/>
-              <a:cs typeface="Calibri" panose="020F0502020204030204" pitchFamily="34" charset="0"/>
-            </a:endParaRPr>
+              <a:t>-python is an implementation of the CF data model that:</a:t>
+            </a:r>
           </a:p>
           <a:p>
             <a:pPr marL="457200" indent="-457200" eaLnBrk="1" hangingPunct="1">
@@ -4918,6 +5573,348 @@
       </p:grpSpPr>
       <p:sp>
         <p:nvSpPr>
+          <p:cNvPr id="2" name="Title 1"/>
+          <p:cNvSpPr txBox="1">
+            <a:spLocks/>
+          </p:cNvSpPr>
+          <p:nvPr/>
+        </p:nvSpPr>
+        <p:spPr bwMode="auto">
+          <a:xfrm>
+            <a:off x="436563" y="198438"/>
+            <a:ext cx="8229600" cy="1143000"/>
+          </a:xfrm>
+          <a:prstGeom prst="rect">
+            <a:avLst/>
+          </a:prstGeom>
+          <a:noFill/>
+          <a:ln>
+            <a:noFill/>
+          </a:ln>
+          <a:extLst>
+            <a:ext uri="{909E8E84-426E-40DD-AFC4-6F175D3DCCD1}">
+              <a14:hiddenFill xmlns:a14="http://schemas.microsoft.com/office/drawing/2010/main">
+                <a:solidFill>
+                  <a:srgbClr val="FFFFFF"/>
+                </a:solidFill>
+              </a14:hiddenFill>
+            </a:ext>
+            <a:ext uri="{91240B29-F687-4F45-9708-019B960494DF}">
+              <a14:hiddenLine xmlns:a14="http://schemas.microsoft.com/office/drawing/2010/main" w="9525">
+                <a:solidFill>
+                  <a:srgbClr val="000000"/>
+                </a:solidFill>
+                <a:miter lim="800000"/>
+                <a:headEnd/>
+                <a:tailEnd/>
+              </a14:hiddenLine>
+            </a:ext>
+          </a:extLst>
+        </p:spPr>
+        <p:txBody>
+          <a:bodyPr vert="horz" wrap="square" lIns="91440" tIns="45720" rIns="91440" bIns="45720" numCol="1" anchor="ctr" anchorCtr="0" compatLnSpc="1">
+            <a:prstTxWarp prst="textNoShape">
+              <a:avLst/>
+            </a:prstTxWarp>
+          </a:bodyPr>
+          <a:lstStyle>
+            <a:lvl1pPr algn="ctr" rtl="0" fontAlgn="base">
+              <a:lnSpc>
+                <a:spcPct val="90000"/>
+              </a:lnSpc>
+              <a:spcBef>
+                <a:spcPct val="0"/>
+              </a:spcBef>
+              <a:spcAft>
+                <a:spcPct val="0"/>
+              </a:spcAft>
+              <a:defRPr sz="3200" kern="1200">
+                <a:solidFill>
+                  <a:schemeClr val="tx1"/>
+                </a:solidFill>
+                <a:latin typeface="+mn-lt"/>
+                <a:ea typeface="+mj-ea"/>
+                <a:cs typeface="Calibri" panose="020F0502020204030204" pitchFamily="34" charset="0"/>
+              </a:defRPr>
+            </a:lvl1pPr>
+            <a:lvl2pPr algn="ctr" rtl="0" fontAlgn="base">
+              <a:lnSpc>
+                <a:spcPct val="90000"/>
+              </a:lnSpc>
+              <a:spcBef>
+                <a:spcPct val="0"/>
+              </a:spcBef>
+              <a:spcAft>
+                <a:spcPct val="0"/>
+              </a:spcAft>
+              <a:defRPr sz="3200">
+                <a:solidFill>
+                  <a:schemeClr val="tx1"/>
+                </a:solidFill>
+                <a:latin typeface="Calibri" panose="020F0502020204030204" pitchFamily="34" charset="0"/>
+                <a:cs typeface="Calibri" panose="020F0502020204030204" pitchFamily="34" charset="0"/>
+              </a:defRPr>
+            </a:lvl2pPr>
+            <a:lvl3pPr algn="ctr" rtl="0" fontAlgn="base">
+              <a:lnSpc>
+                <a:spcPct val="90000"/>
+              </a:lnSpc>
+              <a:spcBef>
+                <a:spcPct val="0"/>
+              </a:spcBef>
+              <a:spcAft>
+                <a:spcPct val="0"/>
+              </a:spcAft>
+              <a:defRPr sz="3200">
+                <a:solidFill>
+                  <a:schemeClr val="tx1"/>
+                </a:solidFill>
+                <a:latin typeface="Calibri" panose="020F0502020204030204" pitchFamily="34" charset="0"/>
+                <a:cs typeface="Calibri" panose="020F0502020204030204" pitchFamily="34" charset="0"/>
+              </a:defRPr>
+            </a:lvl3pPr>
+            <a:lvl4pPr algn="ctr" rtl="0" fontAlgn="base">
+              <a:lnSpc>
+                <a:spcPct val="90000"/>
+              </a:lnSpc>
+              <a:spcBef>
+                <a:spcPct val="0"/>
+              </a:spcBef>
+              <a:spcAft>
+                <a:spcPct val="0"/>
+              </a:spcAft>
+              <a:defRPr sz="3200">
+                <a:solidFill>
+                  <a:schemeClr val="tx1"/>
+                </a:solidFill>
+                <a:latin typeface="Calibri" panose="020F0502020204030204" pitchFamily="34" charset="0"/>
+                <a:cs typeface="Calibri" panose="020F0502020204030204" pitchFamily="34" charset="0"/>
+              </a:defRPr>
+            </a:lvl4pPr>
+            <a:lvl5pPr algn="ctr" rtl="0" fontAlgn="base">
+              <a:lnSpc>
+                <a:spcPct val="90000"/>
+              </a:lnSpc>
+              <a:spcBef>
+                <a:spcPct val="0"/>
+              </a:spcBef>
+              <a:spcAft>
+                <a:spcPct val="0"/>
+              </a:spcAft>
+              <a:defRPr sz="3200">
+                <a:solidFill>
+                  <a:schemeClr val="tx1"/>
+                </a:solidFill>
+                <a:latin typeface="Calibri" panose="020F0502020204030204" pitchFamily="34" charset="0"/>
+                <a:cs typeface="Calibri" panose="020F0502020204030204" pitchFamily="34" charset="0"/>
+              </a:defRPr>
+            </a:lvl5pPr>
+            <a:lvl6pPr marL="457200" algn="ctr" rtl="0" fontAlgn="base">
+              <a:lnSpc>
+                <a:spcPct val="90000"/>
+              </a:lnSpc>
+              <a:spcBef>
+                <a:spcPct val="0"/>
+              </a:spcBef>
+              <a:spcAft>
+                <a:spcPct val="0"/>
+              </a:spcAft>
+              <a:defRPr sz="3200">
+                <a:solidFill>
+                  <a:schemeClr val="tx1"/>
+                </a:solidFill>
+                <a:latin typeface="Calibri" panose="020F0502020204030204" pitchFamily="34" charset="0"/>
+                <a:cs typeface="Calibri" panose="020F0502020204030204" pitchFamily="34" charset="0"/>
+              </a:defRPr>
+            </a:lvl6pPr>
+            <a:lvl7pPr marL="914400" algn="ctr" rtl="0" fontAlgn="base">
+              <a:lnSpc>
+                <a:spcPct val="90000"/>
+              </a:lnSpc>
+              <a:spcBef>
+                <a:spcPct val="0"/>
+              </a:spcBef>
+              <a:spcAft>
+                <a:spcPct val="0"/>
+              </a:spcAft>
+              <a:defRPr sz="3200">
+                <a:solidFill>
+                  <a:schemeClr val="tx1"/>
+                </a:solidFill>
+                <a:latin typeface="Calibri" panose="020F0502020204030204" pitchFamily="34" charset="0"/>
+                <a:cs typeface="Calibri" panose="020F0502020204030204" pitchFamily="34" charset="0"/>
+              </a:defRPr>
+            </a:lvl7pPr>
+            <a:lvl8pPr marL="1371600" algn="ctr" rtl="0" fontAlgn="base">
+              <a:lnSpc>
+                <a:spcPct val="90000"/>
+              </a:lnSpc>
+              <a:spcBef>
+                <a:spcPct val="0"/>
+              </a:spcBef>
+              <a:spcAft>
+                <a:spcPct val="0"/>
+              </a:spcAft>
+              <a:defRPr sz="3200">
+                <a:solidFill>
+                  <a:schemeClr val="tx1"/>
+                </a:solidFill>
+                <a:latin typeface="Calibri" panose="020F0502020204030204" pitchFamily="34" charset="0"/>
+                <a:cs typeface="Calibri" panose="020F0502020204030204" pitchFamily="34" charset="0"/>
+              </a:defRPr>
+            </a:lvl8pPr>
+            <a:lvl9pPr marL="1828800" algn="ctr" rtl="0" fontAlgn="base">
+              <a:lnSpc>
+                <a:spcPct val="90000"/>
+              </a:lnSpc>
+              <a:spcBef>
+                <a:spcPct val="0"/>
+              </a:spcBef>
+              <a:spcAft>
+                <a:spcPct val="0"/>
+              </a:spcAft>
+              <a:defRPr sz="3200">
+                <a:solidFill>
+                  <a:schemeClr val="tx1"/>
+                </a:solidFill>
+                <a:latin typeface="Calibri" panose="020F0502020204030204" pitchFamily="34" charset="0"/>
+                <a:cs typeface="Calibri" panose="020F0502020204030204" pitchFamily="34" charset="0"/>
+              </a:defRPr>
+            </a:lvl9pPr>
+          </a:lstStyle>
+          <a:p>
+            <a:pPr eaLnBrk="1" hangingPunct="1"/>
+            <a:r>
+              <a:rPr lang="en-GB" altLang="en-US" b="1" dirty="0" smtClean="0"/>
+              <a:t>A foreword</a:t>
+            </a:r>
+            <a:endParaRPr lang="en-GB" altLang="en-US" b="1" dirty="0" smtClean="0"/>
+          </a:p>
+        </p:txBody>
+      </p:sp>
+      <p:sp>
+        <p:nvSpPr>
+          <p:cNvPr id="3" name="TextBox 2"/>
+          <p:cNvSpPr txBox="1"/>
+          <p:nvPr/>
+        </p:nvSpPr>
+        <p:spPr>
+          <a:xfrm>
+            <a:off x="436563" y="1341438"/>
+            <a:ext cx="8528050" cy="3539430"/>
+          </a:xfrm>
+          <a:prstGeom prst="rect">
+            <a:avLst/>
+          </a:prstGeom>
+          <a:noFill/>
+        </p:spPr>
+        <p:txBody>
+          <a:bodyPr>
+            <a:spAutoFit/>
+          </a:bodyPr>
+          <a:lstStyle/>
+          <a:p>
+            <a:pPr eaLnBrk="1" hangingPunct="1">
+              <a:defRPr/>
+            </a:pPr>
+            <a:r>
+              <a:rPr lang="en-GB" sz="2800" spc="-5" dirty="0" smtClean="0">
+                <a:latin typeface="Calibri" panose="020F0502020204030204" pitchFamily="34" charset="0"/>
+                <a:cs typeface="Calibri" panose="020F0502020204030204" pitchFamily="34" charset="0"/>
+              </a:rPr>
+              <a:t>At the moment </a:t>
+            </a:r>
+            <a:r>
+              <a:rPr lang="en-GB" sz="2800" spc="-5" dirty="0" err="1" smtClean="0">
+                <a:latin typeface="Calibri" panose="020F0502020204030204" pitchFamily="34" charset="0"/>
+                <a:cs typeface="Calibri" panose="020F0502020204030204" pitchFamily="34" charset="0"/>
+              </a:rPr>
+              <a:t>cf</a:t>
+            </a:r>
+            <a:r>
+              <a:rPr lang="en-GB" sz="2800" spc="-5" dirty="0" smtClean="0">
+                <a:latin typeface="Calibri" panose="020F0502020204030204" pitchFamily="34" charset="0"/>
+                <a:cs typeface="Calibri" panose="020F0502020204030204" pitchFamily="34" charset="0"/>
+              </a:rPr>
+              <a:t>-python and </a:t>
+            </a:r>
+            <a:r>
+              <a:rPr lang="en-GB" sz="2800" spc="-5" dirty="0" err="1" smtClean="0">
+                <a:latin typeface="Calibri" panose="020F0502020204030204" pitchFamily="34" charset="0"/>
+                <a:cs typeface="Calibri" panose="020F0502020204030204" pitchFamily="34" charset="0"/>
+              </a:rPr>
+              <a:t>cf</a:t>
+            </a:r>
+            <a:r>
+              <a:rPr lang="en-GB" sz="2800" spc="-5" dirty="0" smtClean="0">
+                <a:latin typeface="Calibri" panose="020F0502020204030204" pitchFamily="34" charset="0"/>
+                <a:cs typeface="Calibri" panose="020F0502020204030204" pitchFamily="34" charset="0"/>
+              </a:rPr>
+              <a:t>-plot only work with Python 2 and are hopefully getting Python 3 support at some point in 2019.</a:t>
+            </a:r>
+          </a:p>
+          <a:p>
+            <a:pPr eaLnBrk="1" hangingPunct="1">
+              <a:defRPr/>
+            </a:pPr>
+            <a:r>
+              <a:rPr lang="en-GB" sz="2800" spc="-5" dirty="0" smtClean="0">
+                <a:latin typeface="Calibri" panose="020F0502020204030204" pitchFamily="34" charset="0"/>
+                <a:cs typeface="Calibri" panose="020F0502020204030204" pitchFamily="34" charset="0"/>
+              </a:rPr>
+              <a:t>For the sake of completeness we will show you how to use them regardless.</a:t>
+            </a:r>
+          </a:p>
+          <a:p>
+            <a:pPr eaLnBrk="1" hangingPunct="1">
+              <a:defRPr/>
+            </a:pPr>
+            <a:r>
+              <a:rPr lang="en-GB" sz="2800" spc="-5" dirty="0" smtClean="0">
+                <a:latin typeface="Calibri" panose="020F0502020204030204" pitchFamily="34" charset="0"/>
+                <a:cs typeface="Calibri" panose="020F0502020204030204" pitchFamily="34" charset="0"/>
+              </a:rPr>
+              <a:t>If you want to use them yourself you can do so if you install Python 2 or just wait until they are updated with Python 3 compatibility.</a:t>
+            </a:r>
+            <a:endParaRPr lang="en-GB" sz="2800" spc="-5" dirty="0">
+              <a:latin typeface="Calibri" panose="020F0502020204030204" pitchFamily="34" charset="0"/>
+              <a:cs typeface="Calibri" panose="020F0502020204030204" pitchFamily="34" charset="0"/>
+            </a:endParaRPr>
+          </a:p>
+        </p:txBody>
+      </p:sp>
+    </p:spTree>
+    <p:extLst>
+      <p:ext uri="{BB962C8B-B14F-4D97-AF65-F5344CB8AC3E}">
+        <p14:creationId xmlns:p14="http://schemas.microsoft.com/office/powerpoint/2010/main" val="839606135"/>
+      </p:ext>
+    </p:extLst>
+  </p:cSld>
+  <p:clrMapOvr>
+    <a:masterClrMapping/>
+  </p:clrMapOvr>
+</p:sld>
+</file>
+
+<file path=ppt/slides/slide4.xml><?xml version="1.0" encoding="utf-8"?>
+<p:sld xmlns:a="http://schemas.openxmlformats.org/drawingml/2006/main" xmlns:r="http://schemas.openxmlformats.org/officeDocument/2006/relationships" xmlns:p="http://schemas.openxmlformats.org/presentationml/2006/main">
+  <p:cSld>
+    <p:spTree>
+      <p:nvGrpSpPr>
+        <p:cNvPr id="1" name=""/>
+        <p:cNvGrpSpPr/>
+        <p:nvPr/>
+      </p:nvGrpSpPr>
+      <p:grpSpPr>
+        <a:xfrm>
+          <a:off x="0" y="0"/>
+          <a:ext cx="0" cy="0"/>
+          <a:chOff x="0" y="0"/>
+          <a:chExt cx="0" cy="0"/>
+        </a:xfrm>
+      </p:grpSpPr>
+      <p:sp>
+        <p:nvSpPr>
           <p:cNvPr id="10242" name="Title 1"/>
           <p:cNvSpPr>
             <a:spLocks noGrp="1"/>
@@ -4985,13 +5982,7 @@
               <a:rPr lang="en-GB" sz="2000" dirty="0">
                 <a:hlinkClick r:id="rId2"/>
               </a:rPr>
-              <a:t>https://</a:t>
-            </a:r>
-            <a:r>
-              <a:rPr lang="en-GB" sz="2000" dirty="0">
-                <a:hlinkClick r:id="rId2"/>
-              </a:rPr>
-              <a:t>cfpython.bitbucket.io/docs/latest/index.html</a:t>
+              <a:t>https://cfpython.bitbucket.io/docs/latest/index.html</a:t>
             </a:r>
             <a:endParaRPr lang="en-GB" sz="2000" dirty="0"/>
           </a:p>
@@ -5066,7 +6057,7 @@
 </p:sld>
 </file>
 
-<file path=ppt/slides/slide4.xml><?xml version="1.0" encoding="utf-8"?>
+<file path=ppt/slides/slide5.xml><?xml version="1.0" encoding="utf-8"?>
 <p:sld xmlns:a="http://schemas.openxmlformats.org/drawingml/2006/main" xmlns:r="http://schemas.openxmlformats.org/officeDocument/2006/relationships" xmlns:p="http://schemas.openxmlformats.org/presentationml/2006/main">
   <p:cSld>
     <p:spTree>
@@ -5591,7 +6582,7 @@
 </p:sld>
 </file>
 
-<file path=ppt/slides/slide5.xml><?xml version="1.0" encoding="utf-8"?>
+<file path=ppt/slides/slide6.xml><?xml version="1.0" encoding="utf-8"?>
 <p:sld xmlns:a="http://schemas.openxmlformats.org/drawingml/2006/main" xmlns:r="http://schemas.openxmlformats.org/officeDocument/2006/relationships" xmlns:p="http://schemas.openxmlformats.org/presentationml/2006/main">
   <p:cSld>
     <p:spTree>
@@ -6548,7 +7539,7 @@
 </p:sld>
 </file>
 
-<file path=ppt/slides/slide6.xml><?xml version="1.0" encoding="utf-8"?>
+<file path=ppt/slides/slide7.xml><?xml version="1.0" encoding="utf-8"?>
 <p:sld xmlns:a="http://schemas.openxmlformats.org/drawingml/2006/main" xmlns:r="http://schemas.openxmlformats.org/officeDocument/2006/relationships" xmlns:p="http://schemas.openxmlformats.org/presentationml/2006/main">
   <p:cSld>
     <p:spTree>
@@ -7064,14 +8055,7 @@
                 <a:latin typeface="Courier New" panose="02070309020205020404" pitchFamily="49" charset="0"/>
                 <a:cs typeface="Courier New" panose="02070309020205020404" pitchFamily="49" charset="0"/>
               </a:rPr>
-              <a:t>('temperature', </a:t>
-            </a:r>
-            <a:r>
-              <a:rPr lang="en-GB" dirty="0">
-                <a:latin typeface="Courier New" panose="02070309020205020404" pitchFamily="49" charset="0"/>
-                <a:cs typeface="Courier New" panose="02070309020205020404" pitchFamily="49" charset="0"/>
-              </a:rPr>
-              <a:t>regex=True)</a:t>
+              <a:t>('temperature', regex=True)</a:t>
             </a:r>
           </a:p>
           <a:p>
@@ -7147,14 +8131,7 @@
                 <a:latin typeface="Courier New" panose="02070309020205020404" pitchFamily="49" charset="0"/>
                 <a:cs typeface="Courier New" panose="02070309020205020404" pitchFamily="49" charset="0"/>
               </a:rPr>
-              <a:t>={'longitude': </a:t>
-            </a:r>
-            <a:r>
-              <a:rPr lang="en-GB" dirty="0">
-                <a:latin typeface="Courier New" panose="02070309020205020404" pitchFamily="49" charset="0"/>
-                <a:cs typeface="Courier New" panose="02070309020205020404" pitchFamily="49" charset="0"/>
-              </a:rPr>
-              <a:t>0})</a:t>
+              <a:t>={'longitude': 0})</a:t>
             </a:r>
           </a:p>
           <a:p>
@@ -7277,7 +8254,7 @@
 </p:sld>
 </file>
 
-<file path=ppt/slides/slide7.xml><?xml version="1.0" encoding="utf-8"?>
+<file path=ppt/slides/slide8.xml><?xml version="1.0" encoding="utf-8"?>
 <p:sld xmlns:a="http://schemas.openxmlformats.org/drawingml/2006/main" xmlns:r="http://schemas.openxmlformats.org/officeDocument/2006/relationships" xmlns:p="http://schemas.openxmlformats.org/presentationml/2006/main">
   <p:cSld>
     <p:spTree>
@@ -7825,7 +8802,7 @@
 </p:sld>
 </file>
 
-<file path=ppt/slides/slide8.xml><?xml version="1.0" encoding="utf-8"?>
+<file path=ppt/slides/slide9.xml><?xml version="1.0" encoding="utf-8"?>
 <p:sld xmlns:a="http://schemas.openxmlformats.org/drawingml/2006/main" xmlns:r="http://schemas.openxmlformats.org/officeDocument/2006/relationships" xmlns:p="http://schemas.openxmlformats.org/presentationml/2006/main">
   <p:cSld>
     <p:spTree>
@@ -8432,714 +9409,6 @@
             </a:pPr>
             <a:endParaRPr lang="en-GB" altLang="en-US">
               <a:cs typeface="Calibri" panose="020F0502020204030204" pitchFamily="34" charset="0"/>
-            </a:endParaRPr>
-          </a:p>
-        </p:txBody>
-      </p:sp>
-    </p:spTree>
-  </p:cSld>
-  <p:clrMapOvr>
-    <a:masterClrMapping/>
-  </p:clrMapOvr>
-  <p:timing>
-    <p:tnLst>
-      <p:par>
-        <p:cTn id="1" dur="indefinite" restart="never" nodeType="tmRoot"/>
-      </p:par>
-    </p:tnLst>
-  </p:timing>
-</p:sld>
-</file>
-
-<file path=ppt/slides/slide9.xml><?xml version="1.0" encoding="utf-8"?>
-<p:sld xmlns:a="http://schemas.openxmlformats.org/drawingml/2006/main" xmlns:r="http://schemas.openxmlformats.org/officeDocument/2006/relationships" xmlns:p="http://schemas.openxmlformats.org/presentationml/2006/main">
-  <p:cSld>
-    <p:spTree>
-      <p:nvGrpSpPr>
-        <p:cNvPr id="1" name=""/>
-        <p:cNvGrpSpPr/>
-        <p:nvPr/>
-      </p:nvGrpSpPr>
-      <p:grpSpPr>
-        <a:xfrm>
-          <a:off x="0" y="0"/>
-          <a:ext cx="0" cy="0"/>
-          <a:chOff x="0" y="0"/>
-          <a:chExt cx="0" cy="0"/>
-        </a:xfrm>
-      </p:grpSpPr>
-      <p:sp>
-        <p:nvSpPr>
-          <p:cNvPr id="16386" name="Title 1"/>
-          <p:cNvSpPr txBox="1">
-            <a:spLocks/>
-          </p:cNvSpPr>
-          <p:nvPr/>
-        </p:nvSpPr>
-        <p:spPr bwMode="auto">
-          <a:xfrm>
-            <a:off x="457200" y="274638"/>
-            <a:ext cx="8229600" cy="1143000"/>
-          </a:xfrm>
-          <a:prstGeom prst="rect">
-            <a:avLst/>
-          </a:prstGeom>
-          <a:noFill/>
-          <a:ln>
-            <a:noFill/>
-          </a:ln>
-          <a:extLst>
-            <a:ext uri="{909E8E84-426E-40DD-AFC4-6F175D3DCCD1}">
-              <a14:hiddenFill xmlns:a14="http://schemas.microsoft.com/office/drawing/2010/main">
-                <a:solidFill>
-                  <a:srgbClr val="FFFFFF"/>
-                </a:solidFill>
-              </a14:hiddenFill>
-            </a:ext>
-            <a:ext uri="{91240B29-F687-4F45-9708-019B960494DF}">
-              <a14:hiddenLine xmlns:a14="http://schemas.microsoft.com/office/drawing/2010/main" w="9525">
-                <a:solidFill>
-                  <a:srgbClr val="000000"/>
-                </a:solidFill>
-                <a:miter lim="800000"/>
-                <a:headEnd/>
-                <a:tailEnd/>
-              </a14:hiddenLine>
-            </a:ext>
-          </a:extLst>
-        </p:spPr>
-        <p:txBody>
-          <a:bodyPr anchor="ctr"/>
-          <a:lstStyle>
-            <a:lvl1pPr>
-              <a:lnSpc>
-                <a:spcPct val="90000"/>
-              </a:lnSpc>
-              <a:spcBef>
-                <a:spcPts val="1000"/>
-              </a:spcBef>
-              <a:buFont typeface="Arial" panose="020B0604020202020204" pitchFamily="34" charset="0"/>
-              <a:buChar char="•"/>
-              <a:defRPr sz="2400">
-                <a:solidFill>
-                  <a:schemeClr val="tx1"/>
-                </a:solidFill>
-                <a:latin typeface="Calibri" panose="020F0502020204030204" pitchFamily="34" charset="0"/>
-              </a:defRPr>
-            </a:lvl1pPr>
-            <a:lvl2pPr marL="742950" indent="-285750">
-              <a:lnSpc>
-                <a:spcPct val="90000"/>
-              </a:lnSpc>
-              <a:spcBef>
-                <a:spcPts val="500"/>
-              </a:spcBef>
-              <a:buFont typeface="Arial" panose="020B0604020202020204" pitchFamily="34" charset="0"/>
-              <a:buChar char="•"/>
-              <a:defRPr sz="2000">
-                <a:solidFill>
-                  <a:schemeClr val="tx1"/>
-                </a:solidFill>
-                <a:latin typeface="Calibri" panose="020F0502020204030204" pitchFamily="34" charset="0"/>
-              </a:defRPr>
-            </a:lvl2pPr>
-            <a:lvl3pPr marL="1143000" indent="-228600">
-              <a:lnSpc>
-                <a:spcPct val="90000"/>
-              </a:lnSpc>
-              <a:spcBef>
-                <a:spcPts val="500"/>
-              </a:spcBef>
-              <a:buFont typeface="Arial" panose="020B0604020202020204" pitchFamily="34" charset="0"/>
-              <a:buChar char="•"/>
-              <a:defRPr>
-                <a:solidFill>
-                  <a:schemeClr val="tx1"/>
-                </a:solidFill>
-                <a:latin typeface="Calibri" panose="020F0502020204030204" pitchFamily="34" charset="0"/>
-              </a:defRPr>
-            </a:lvl3pPr>
-            <a:lvl4pPr marL="1600200" indent="-228600">
-              <a:lnSpc>
-                <a:spcPct val="90000"/>
-              </a:lnSpc>
-              <a:spcBef>
-                <a:spcPts val="500"/>
-              </a:spcBef>
-              <a:buFont typeface="Arial" panose="020B0604020202020204" pitchFamily="34" charset="0"/>
-              <a:buChar char="•"/>
-              <a:defRPr sz="1600">
-                <a:solidFill>
-                  <a:schemeClr val="tx1"/>
-                </a:solidFill>
-                <a:latin typeface="Calibri" panose="020F0502020204030204" pitchFamily="34" charset="0"/>
-              </a:defRPr>
-            </a:lvl4pPr>
-            <a:lvl5pPr marL="2057400" indent="-228600">
-              <a:lnSpc>
-                <a:spcPct val="90000"/>
-              </a:lnSpc>
-              <a:spcBef>
-                <a:spcPts val="500"/>
-              </a:spcBef>
-              <a:buFont typeface="Arial" panose="020B0604020202020204" pitchFamily="34" charset="0"/>
-              <a:buChar char="•"/>
-              <a:defRPr sz="1600">
-                <a:solidFill>
-                  <a:schemeClr val="tx1"/>
-                </a:solidFill>
-                <a:latin typeface="Calibri" panose="020F0502020204030204" pitchFamily="34" charset="0"/>
-              </a:defRPr>
-            </a:lvl5pPr>
-            <a:lvl6pPr marL="2514600" indent="-228600" fontAlgn="base">
-              <a:lnSpc>
-                <a:spcPct val="90000"/>
-              </a:lnSpc>
-              <a:spcBef>
-                <a:spcPts val="500"/>
-              </a:spcBef>
-              <a:spcAft>
-                <a:spcPct val="0"/>
-              </a:spcAft>
-              <a:buFont typeface="Arial" panose="020B0604020202020204" pitchFamily="34" charset="0"/>
-              <a:buChar char="•"/>
-              <a:defRPr sz="1600">
-                <a:solidFill>
-                  <a:schemeClr val="tx1"/>
-                </a:solidFill>
-                <a:latin typeface="Calibri" panose="020F0502020204030204" pitchFamily="34" charset="0"/>
-              </a:defRPr>
-            </a:lvl6pPr>
-            <a:lvl7pPr marL="2971800" indent="-228600" fontAlgn="base">
-              <a:lnSpc>
-                <a:spcPct val="90000"/>
-              </a:lnSpc>
-              <a:spcBef>
-                <a:spcPts val="500"/>
-              </a:spcBef>
-              <a:spcAft>
-                <a:spcPct val="0"/>
-              </a:spcAft>
-              <a:buFont typeface="Arial" panose="020B0604020202020204" pitchFamily="34" charset="0"/>
-              <a:buChar char="•"/>
-              <a:defRPr sz="1600">
-                <a:solidFill>
-                  <a:schemeClr val="tx1"/>
-                </a:solidFill>
-                <a:latin typeface="Calibri" panose="020F0502020204030204" pitchFamily="34" charset="0"/>
-              </a:defRPr>
-            </a:lvl7pPr>
-            <a:lvl8pPr marL="3429000" indent="-228600" fontAlgn="base">
-              <a:lnSpc>
-                <a:spcPct val="90000"/>
-              </a:lnSpc>
-              <a:spcBef>
-                <a:spcPts val="500"/>
-              </a:spcBef>
-              <a:spcAft>
-                <a:spcPct val="0"/>
-              </a:spcAft>
-              <a:buFont typeface="Arial" panose="020B0604020202020204" pitchFamily="34" charset="0"/>
-              <a:buChar char="•"/>
-              <a:defRPr sz="1600">
-                <a:solidFill>
-                  <a:schemeClr val="tx1"/>
-                </a:solidFill>
-                <a:latin typeface="Calibri" panose="020F0502020204030204" pitchFamily="34" charset="0"/>
-              </a:defRPr>
-            </a:lvl8pPr>
-            <a:lvl9pPr marL="3886200" indent="-228600" fontAlgn="base">
-              <a:lnSpc>
-                <a:spcPct val="90000"/>
-              </a:lnSpc>
-              <a:spcBef>
-                <a:spcPts val="500"/>
-              </a:spcBef>
-              <a:spcAft>
-                <a:spcPct val="0"/>
-              </a:spcAft>
-              <a:buFont typeface="Arial" panose="020B0604020202020204" pitchFamily="34" charset="0"/>
-              <a:buChar char="•"/>
-              <a:defRPr sz="1600">
-                <a:solidFill>
-                  <a:schemeClr val="tx1"/>
-                </a:solidFill>
-                <a:latin typeface="Calibri" panose="020F0502020204030204" pitchFamily="34" charset="0"/>
-              </a:defRPr>
-            </a:lvl9pPr>
-          </a:lstStyle>
-          <a:p>
-            <a:pPr algn="ctr">
-              <a:lnSpc>
-                <a:spcPct val="100000"/>
-              </a:lnSpc>
-              <a:spcBef>
-                <a:spcPct val="0"/>
-              </a:spcBef>
-              <a:buFontTx/>
-              <a:buNone/>
-            </a:pPr>
-            <a:r>
-              <a:rPr lang="en-GB" altLang="en-US" sz="4400" b="1">
-                <a:cs typeface="Calibri" panose="020F0502020204030204" pitchFamily="34" charset="0"/>
-              </a:rPr>
-              <a:t>cfa example</a:t>
-            </a:r>
-          </a:p>
-        </p:txBody>
-      </p:sp>
-      <p:sp>
-        <p:nvSpPr>
-          <p:cNvPr id="16387" name="TextBox 2"/>
-          <p:cNvSpPr txBox="1">
-            <a:spLocks noChangeArrowheads="1"/>
-          </p:cNvSpPr>
-          <p:nvPr/>
-        </p:nvSpPr>
-        <p:spPr bwMode="auto">
-          <a:xfrm>
-            <a:off x="468313" y="1268413"/>
-            <a:ext cx="8424862" cy="4894262"/>
-          </a:xfrm>
-          <a:prstGeom prst="rect">
-            <a:avLst/>
-          </a:prstGeom>
-          <a:noFill/>
-          <a:ln>
-            <a:noFill/>
-          </a:ln>
-          <a:extLst>
-            <a:ext uri="{909E8E84-426E-40DD-AFC4-6F175D3DCCD1}">
-              <a14:hiddenFill xmlns:a14="http://schemas.microsoft.com/office/drawing/2010/main">
-                <a:solidFill>
-                  <a:srgbClr val="FFFFFF"/>
-                </a:solidFill>
-              </a14:hiddenFill>
-            </a:ext>
-            <a:ext uri="{91240B29-F687-4F45-9708-019B960494DF}">
-              <a14:hiddenLine xmlns:a14="http://schemas.microsoft.com/office/drawing/2010/main" w="9525">
-                <a:solidFill>
-                  <a:srgbClr val="000000"/>
-                </a:solidFill>
-                <a:miter lim="800000"/>
-                <a:headEnd/>
-                <a:tailEnd/>
-              </a14:hiddenLine>
-            </a:ext>
-          </a:extLst>
-        </p:spPr>
-        <p:txBody>
-          <a:bodyPr>
-            <a:spAutoFit/>
-          </a:bodyPr>
-          <a:lstStyle>
-            <a:lvl1pPr>
-              <a:lnSpc>
-                <a:spcPct val="90000"/>
-              </a:lnSpc>
-              <a:spcBef>
-                <a:spcPts val="1000"/>
-              </a:spcBef>
-              <a:buFont typeface="Arial" panose="020B0604020202020204" pitchFamily="34" charset="0"/>
-              <a:buChar char="•"/>
-              <a:defRPr sz="2400">
-                <a:solidFill>
-                  <a:schemeClr val="tx1"/>
-                </a:solidFill>
-                <a:latin typeface="Calibri" panose="020F0502020204030204" pitchFamily="34" charset="0"/>
-              </a:defRPr>
-            </a:lvl1pPr>
-            <a:lvl2pPr marL="742950" indent="-285750">
-              <a:lnSpc>
-                <a:spcPct val="90000"/>
-              </a:lnSpc>
-              <a:spcBef>
-                <a:spcPts val="500"/>
-              </a:spcBef>
-              <a:buFont typeface="Arial" panose="020B0604020202020204" pitchFamily="34" charset="0"/>
-              <a:buChar char="•"/>
-              <a:defRPr sz="2000">
-                <a:solidFill>
-                  <a:schemeClr val="tx1"/>
-                </a:solidFill>
-                <a:latin typeface="Calibri" panose="020F0502020204030204" pitchFamily="34" charset="0"/>
-              </a:defRPr>
-            </a:lvl2pPr>
-            <a:lvl3pPr marL="1143000" indent="-228600">
-              <a:lnSpc>
-                <a:spcPct val="90000"/>
-              </a:lnSpc>
-              <a:spcBef>
-                <a:spcPts val="500"/>
-              </a:spcBef>
-              <a:buFont typeface="Arial" panose="020B0604020202020204" pitchFamily="34" charset="0"/>
-              <a:buChar char="•"/>
-              <a:defRPr>
-                <a:solidFill>
-                  <a:schemeClr val="tx1"/>
-                </a:solidFill>
-                <a:latin typeface="Calibri" panose="020F0502020204030204" pitchFamily="34" charset="0"/>
-              </a:defRPr>
-            </a:lvl3pPr>
-            <a:lvl4pPr marL="1600200" indent="-228600">
-              <a:lnSpc>
-                <a:spcPct val="90000"/>
-              </a:lnSpc>
-              <a:spcBef>
-                <a:spcPts val="500"/>
-              </a:spcBef>
-              <a:buFont typeface="Arial" panose="020B0604020202020204" pitchFamily="34" charset="0"/>
-              <a:buChar char="•"/>
-              <a:defRPr sz="1600">
-                <a:solidFill>
-                  <a:schemeClr val="tx1"/>
-                </a:solidFill>
-                <a:latin typeface="Calibri" panose="020F0502020204030204" pitchFamily="34" charset="0"/>
-              </a:defRPr>
-            </a:lvl4pPr>
-            <a:lvl5pPr marL="2057400" indent="-228600">
-              <a:lnSpc>
-                <a:spcPct val="90000"/>
-              </a:lnSpc>
-              <a:spcBef>
-                <a:spcPts val="500"/>
-              </a:spcBef>
-              <a:buFont typeface="Arial" panose="020B0604020202020204" pitchFamily="34" charset="0"/>
-              <a:buChar char="•"/>
-              <a:defRPr sz="1600">
-                <a:solidFill>
-                  <a:schemeClr val="tx1"/>
-                </a:solidFill>
-                <a:latin typeface="Calibri" panose="020F0502020204030204" pitchFamily="34" charset="0"/>
-              </a:defRPr>
-            </a:lvl5pPr>
-            <a:lvl6pPr marL="2514600" indent="-228600" fontAlgn="base">
-              <a:lnSpc>
-                <a:spcPct val="90000"/>
-              </a:lnSpc>
-              <a:spcBef>
-                <a:spcPts val="500"/>
-              </a:spcBef>
-              <a:spcAft>
-                <a:spcPct val="0"/>
-              </a:spcAft>
-              <a:buFont typeface="Arial" panose="020B0604020202020204" pitchFamily="34" charset="0"/>
-              <a:buChar char="•"/>
-              <a:defRPr sz="1600">
-                <a:solidFill>
-                  <a:schemeClr val="tx1"/>
-                </a:solidFill>
-                <a:latin typeface="Calibri" panose="020F0502020204030204" pitchFamily="34" charset="0"/>
-              </a:defRPr>
-            </a:lvl6pPr>
-            <a:lvl7pPr marL="2971800" indent="-228600" fontAlgn="base">
-              <a:lnSpc>
-                <a:spcPct val="90000"/>
-              </a:lnSpc>
-              <a:spcBef>
-                <a:spcPts val="500"/>
-              </a:spcBef>
-              <a:spcAft>
-                <a:spcPct val="0"/>
-              </a:spcAft>
-              <a:buFont typeface="Arial" panose="020B0604020202020204" pitchFamily="34" charset="0"/>
-              <a:buChar char="•"/>
-              <a:defRPr sz="1600">
-                <a:solidFill>
-                  <a:schemeClr val="tx1"/>
-                </a:solidFill>
-                <a:latin typeface="Calibri" panose="020F0502020204030204" pitchFamily="34" charset="0"/>
-              </a:defRPr>
-            </a:lvl7pPr>
-            <a:lvl8pPr marL="3429000" indent="-228600" fontAlgn="base">
-              <a:lnSpc>
-                <a:spcPct val="90000"/>
-              </a:lnSpc>
-              <a:spcBef>
-                <a:spcPts val="500"/>
-              </a:spcBef>
-              <a:spcAft>
-                <a:spcPct val="0"/>
-              </a:spcAft>
-              <a:buFont typeface="Arial" panose="020B0604020202020204" pitchFamily="34" charset="0"/>
-              <a:buChar char="•"/>
-              <a:defRPr sz="1600">
-                <a:solidFill>
-                  <a:schemeClr val="tx1"/>
-                </a:solidFill>
-                <a:latin typeface="Calibri" panose="020F0502020204030204" pitchFamily="34" charset="0"/>
-              </a:defRPr>
-            </a:lvl8pPr>
-            <a:lvl9pPr marL="3886200" indent="-228600" fontAlgn="base">
-              <a:lnSpc>
-                <a:spcPct val="90000"/>
-              </a:lnSpc>
-              <a:spcBef>
-                <a:spcPts val="500"/>
-              </a:spcBef>
-              <a:spcAft>
-                <a:spcPct val="0"/>
-              </a:spcAft>
-              <a:buFont typeface="Arial" panose="020B0604020202020204" pitchFamily="34" charset="0"/>
-              <a:buChar char="•"/>
-              <a:defRPr sz="1600">
-                <a:solidFill>
-                  <a:schemeClr val="tx1"/>
-                </a:solidFill>
-                <a:latin typeface="Calibri" panose="020F0502020204030204" pitchFamily="34" charset="0"/>
-              </a:defRPr>
-            </a:lvl9pPr>
-          </a:lstStyle>
-          <a:p>
-            <a:pPr eaLnBrk="1" hangingPunct="1">
-              <a:lnSpc>
-                <a:spcPct val="100000"/>
-              </a:lnSpc>
-              <a:spcBef>
-                <a:spcPct val="0"/>
-              </a:spcBef>
-              <a:buFontTx/>
-              <a:buNone/>
-            </a:pPr>
-            <a:r>
-              <a:rPr lang="en-GB" altLang="en-US" b="1">
-                <a:cs typeface="Calibri" panose="020F0502020204030204" pitchFamily="34" charset="0"/>
-              </a:rPr>
-              <a:t>cfa </a:t>
-            </a:r>
-            <a:r>
-              <a:rPr lang="en-GB" altLang="en-US">
-                <a:cs typeface="Calibri" panose="020F0502020204030204" pitchFamily="34" charset="0"/>
-              </a:rPr>
-              <a:t>can read multiple files and aggregate the contents into a single output file, e.g.:</a:t>
-            </a:r>
-          </a:p>
-          <a:p>
-            <a:pPr eaLnBrk="1" hangingPunct="1">
-              <a:lnSpc>
-                <a:spcPct val="100000"/>
-              </a:lnSpc>
-              <a:spcBef>
-                <a:spcPct val="0"/>
-              </a:spcBef>
-              <a:buFontTx/>
-              <a:buNone/>
-            </a:pPr>
-            <a:endParaRPr lang="en-GB" altLang="en-US">
-              <a:cs typeface="Calibri" panose="020F0502020204030204" pitchFamily="34" charset="0"/>
-            </a:endParaRPr>
-          </a:p>
-          <a:p>
-            <a:pPr>
-              <a:lnSpc>
-                <a:spcPct val="100000"/>
-              </a:lnSpc>
-              <a:spcBef>
-                <a:spcPct val="0"/>
-              </a:spcBef>
-              <a:buFontTx/>
-              <a:buNone/>
-            </a:pPr>
-            <a:r>
-              <a:rPr lang="en-GB" altLang="en-US" b="1">
-                <a:latin typeface="Courier New" panose="02070309020205020404" pitchFamily="49" charset="0"/>
-                <a:cs typeface="Courier New" panose="02070309020205020404" pitchFamily="49" charset="0"/>
-              </a:rPr>
-              <a:t>$ </a:t>
-            </a:r>
-            <a:r>
-              <a:rPr lang="en-GB" altLang="en-US">
-                <a:solidFill>
-                  <a:srgbClr val="336600"/>
-                </a:solidFill>
-                <a:latin typeface="Courier New" panose="02070309020205020404" pitchFamily="49" charset="0"/>
-                <a:cs typeface="Courier New" panose="02070309020205020404" pitchFamily="49" charset="0"/>
-              </a:rPr>
-              <a:t>cfa -o out.nc file1.nc file2.nc</a:t>
-            </a:r>
-          </a:p>
-          <a:p>
-            <a:pPr>
-              <a:lnSpc>
-                <a:spcPct val="100000"/>
-              </a:lnSpc>
-              <a:spcBef>
-                <a:spcPct val="0"/>
-              </a:spcBef>
-              <a:buFontTx/>
-              <a:buNone/>
-            </a:pPr>
-            <a:endParaRPr lang="en-GB" altLang="en-US">
-              <a:latin typeface="Courier New" panose="02070309020205020404" pitchFamily="49" charset="0"/>
-              <a:cs typeface="Courier New" panose="02070309020205020404" pitchFamily="49" charset="0"/>
-            </a:endParaRPr>
-          </a:p>
-          <a:p>
-            <a:pPr>
-              <a:lnSpc>
-                <a:spcPct val="100000"/>
-              </a:lnSpc>
-              <a:spcBef>
-                <a:spcPct val="0"/>
-              </a:spcBef>
-              <a:buFontTx/>
-              <a:buNone/>
-            </a:pPr>
-            <a:r>
-              <a:rPr lang="en-GB" altLang="en-US" b="1">
-                <a:latin typeface="Courier New" panose="02070309020205020404" pitchFamily="49" charset="0"/>
-                <a:cs typeface="Courier New" panose="02070309020205020404" pitchFamily="49" charset="0"/>
-              </a:rPr>
-              <a:t>$ </a:t>
-            </a:r>
-            <a:r>
-              <a:rPr lang="en-GB" altLang="en-US">
-                <a:solidFill>
-                  <a:srgbClr val="336600"/>
-                </a:solidFill>
-                <a:latin typeface="Courier New" panose="02070309020205020404" pitchFamily="49" charset="0"/>
-                <a:cs typeface="Courier New" panose="02070309020205020404" pitchFamily="49" charset="0"/>
-              </a:rPr>
-              <a:t>cfa -o out.nc file[1-9].nc</a:t>
-            </a:r>
-          </a:p>
-          <a:p>
-            <a:pPr>
-              <a:lnSpc>
-                <a:spcPct val="100000"/>
-              </a:lnSpc>
-              <a:spcBef>
-                <a:spcPct val="0"/>
-              </a:spcBef>
-              <a:buFontTx/>
-              <a:buNone/>
-            </a:pPr>
-            <a:endParaRPr lang="en-GB" altLang="en-US">
-              <a:latin typeface="Courier New" panose="02070309020205020404" pitchFamily="49" charset="0"/>
-              <a:cs typeface="Courier New" panose="02070309020205020404" pitchFamily="49" charset="0"/>
-            </a:endParaRPr>
-          </a:p>
-          <a:p>
-            <a:pPr>
-              <a:lnSpc>
-                <a:spcPct val="100000"/>
-              </a:lnSpc>
-              <a:spcBef>
-                <a:spcPct val="0"/>
-              </a:spcBef>
-              <a:buFontTx/>
-              <a:buNone/>
-            </a:pPr>
-            <a:r>
-              <a:rPr lang="en-GB" altLang="en-US" b="1">
-                <a:latin typeface="Courier New" panose="02070309020205020404" pitchFamily="49" charset="0"/>
-                <a:cs typeface="Courier New" panose="02070309020205020404" pitchFamily="49" charset="0"/>
-              </a:rPr>
-              <a:t>$ </a:t>
-            </a:r>
-            <a:r>
-              <a:rPr lang="en-GB" altLang="en-US">
-                <a:solidFill>
-                  <a:srgbClr val="336600"/>
-                </a:solidFill>
-                <a:latin typeface="Courier New" panose="02070309020205020404" pitchFamily="49" charset="0"/>
-                <a:cs typeface="Courier New" panose="02070309020205020404" pitchFamily="49" charset="0"/>
-              </a:rPr>
-              <a:t>cfa -f NETCDF3_CLASSIC -o out.nc data1/*.nc </a:t>
-            </a:r>
-            <a:br>
-              <a:rPr lang="en-GB" altLang="en-US">
-                <a:solidFill>
-                  <a:srgbClr val="336600"/>
-                </a:solidFill>
-                <a:latin typeface="Courier New" panose="02070309020205020404" pitchFamily="49" charset="0"/>
-                <a:cs typeface="Courier New" panose="02070309020205020404" pitchFamily="49" charset="0"/>
-              </a:rPr>
-            </a:br>
-            <a:r>
-              <a:rPr lang="en-GB" altLang="en-US">
-                <a:solidFill>
-                  <a:srgbClr val="336600"/>
-                </a:solidFill>
-                <a:latin typeface="Courier New" panose="02070309020205020404" pitchFamily="49" charset="0"/>
-                <a:cs typeface="Courier New" panose="02070309020205020404" pitchFamily="49" charset="0"/>
-              </a:rPr>
-              <a:t>    data2/*.nc</a:t>
-            </a:r>
-          </a:p>
-          <a:p>
-            <a:pPr>
-              <a:lnSpc>
-                <a:spcPct val="100000"/>
-              </a:lnSpc>
-              <a:spcBef>
-                <a:spcPct val="0"/>
-              </a:spcBef>
-              <a:buFontTx/>
-              <a:buNone/>
-            </a:pPr>
-            <a:endParaRPr lang="en-GB" altLang="en-US">
-              <a:latin typeface="Courier New" panose="02070309020205020404" pitchFamily="49" charset="0"/>
-              <a:cs typeface="Courier New" panose="02070309020205020404" pitchFamily="49" charset="0"/>
-            </a:endParaRPr>
-          </a:p>
-          <a:p>
-            <a:pPr>
-              <a:lnSpc>
-                <a:spcPct val="100000"/>
-              </a:lnSpc>
-              <a:spcBef>
-                <a:spcPct val="0"/>
-              </a:spcBef>
-              <a:buFontTx/>
-              <a:buNone/>
-            </a:pPr>
-            <a:r>
-              <a:rPr lang="en-GB" altLang="en-US" b="1">
-                <a:latin typeface="Courier New" panose="02070309020205020404" pitchFamily="49" charset="0"/>
-                <a:cs typeface="Courier New" panose="02070309020205020404" pitchFamily="49" charset="0"/>
-              </a:rPr>
-              <a:t>$ </a:t>
-            </a:r>
-            <a:r>
-              <a:rPr lang="pt-BR" altLang="en-US">
-                <a:solidFill>
-                  <a:srgbClr val="336600"/>
-                </a:solidFill>
-                <a:latin typeface="Courier New" panose="02070309020205020404" pitchFamily="49" charset="0"/>
-                <a:cs typeface="Courier New" panose="02070309020205020404" pitchFamily="49" charset="0"/>
-              </a:rPr>
-              <a:t>cfa -o out.nc </a:t>
-            </a:r>
-            <a:br>
-              <a:rPr lang="pt-BR" altLang="en-US">
-                <a:solidFill>
-                  <a:srgbClr val="336600"/>
-                </a:solidFill>
-                <a:latin typeface="Courier New" panose="02070309020205020404" pitchFamily="49" charset="0"/>
-                <a:cs typeface="Courier New" panose="02070309020205020404" pitchFamily="49" charset="0"/>
-              </a:rPr>
-            </a:br>
-            <a:r>
-              <a:rPr lang="pt-BR" altLang="en-US">
-                <a:solidFill>
-                  <a:srgbClr val="336600"/>
-                </a:solidFill>
-                <a:latin typeface="Courier New" panose="02070309020205020404" pitchFamily="49" charset="0"/>
-                <a:cs typeface="Courier New" panose="02070309020205020404" pitchFamily="49" charset="0"/>
-              </a:rPr>
-              <a:t>	http://test.opendap.org/dap/coads_climat	ology.nc file*.nc   </a:t>
-            </a:r>
-            <a:r>
-              <a:rPr lang="pt-BR" altLang="en-US">
-                <a:latin typeface="Courier New" panose="02070309020205020404" pitchFamily="49" charset="0"/>
-                <a:cs typeface="Courier New" panose="02070309020205020404" pitchFamily="49" charset="0"/>
-              </a:rPr>
-              <a:t># remote file(s)</a:t>
-            </a:r>
-            <a:endParaRPr lang="en-GB" altLang="en-US">
-              <a:latin typeface="Courier New" panose="02070309020205020404" pitchFamily="49" charset="0"/>
-              <a:cs typeface="Courier New" panose="02070309020205020404" pitchFamily="49" charset="0"/>
             </a:endParaRPr>
           </a:p>
         </p:txBody>

</xml_diff>